<commit_message>
Fixes dead links and updates some outdated slides from Issue #237
</commit_message>
<xml_diff>
--- a/doc/tutorials/BASIS Quick Start Guide - 01 Getting Started.pptx
+++ b/doc/tutorials/BASIS Quick Start Guide - 01 Getting Started.pptx
@@ -219,7 +219,7 @@
           <a:p>
             <a:fld id="{5B59E269-598F-4F58-85D0-C434FC9453F6}" type="datetimeFigureOut">
               <a:rPr lang="en-US" smtClean="0"/>
-              <a:t>10/21/2011</a:t>
+              <a:t>11/11/13</a:t>
             </a:fld>
             <a:endParaRPr lang="en-US"/>
           </a:p>
@@ -2368,36 +2368,6 @@
           </a:p>
         </p:txBody>
       </p:sp>
-      <p:pic>
-        <p:nvPicPr>
-          <p:cNvPr id="11" name="Content Placeholder 3"/>
-          <p:cNvPicPr>
-            <a:picLocks noChangeAspect="1"/>
-          </p:cNvPicPr>
-          <p:nvPr userDrawn="1"/>
-        </p:nvPicPr>
-        <p:blipFill>
-          <a:blip r:embed="rId2">
-            <a:extLst>
-              <a:ext uri="{28A0092B-C50C-407E-A947-70E740481C1C}">
-                <a14:useLocalDpi xmlns:a14="http://schemas.microsoft.com/office/drawing/2010/main" val="0"/>
-              </a:ext>
-            </a:extLst>
-          </a:blip>
-          <a:stretch>
-            <a:fillRect/>
-          </a:stretch>
-        </p:blipFill>
-        <p:spPr>
-          <a:xfrm>
-            <a:off x="838200" y="4267200"/>
-            <a:ext cx="2857500" cy="571500"/>
-          </a:xfrm>
-          <a:prstGeom prst="rect">
-            <a:avLst/>
-          </a:prstGeom>
-        </p:spPr>
-      </p:pic>
       <p:sp>
         <p:nvSpPr>
           <p:cNvPr id="15" name="Date Placeholder 3"/>
@@ -2537,7 +2507,7 @@
   <p:timing>
     <p:tnLst>
       <p:par>
-        <p:cTn id="1" dur="indefinite" restart="never" nodeType="tmRoot"/>
+        <p:cTn xmlns:p14="http://schemas.microsoft.com/office/powerpoint/2010/main" id="1" dur="indefinite" restart="never" nodeType="tmRoot"/>
       </p:par>
     </p:tnLst>
   </p:timing>
@@ -2784,7 +2754,7 @@
   <p:timing>
     <p:tnLst>
       <p:par>
-        <p:cTn id="1" dur="indefinite" restart="never" nodeType="tmRoot"/>
+        <p:cTn xmlns:p14="http://schemas.microsoft.com/office/powerpoint/2010/main" id="1" dur="indefinite" restart="never" nodeType="tmRoot"/>
       </p:par>
     </p:tnLst>
   </p:timing>
@@ -3076,36 +3046,6 @@
           </a:p>
         </p:txBody>
       </p:sp>
-      <p:pic>
-        <p:nvPicPr>
-          <p:cNvPr id="10" name="Content Placeholder 3"/>
-          <p:cNvPicPr>
-            <a:picLocks noChangeAspect="1"/>
-          </p:cNvPicPr>
-          <p:nvPr userDrawn="1"/>
-        </p:nvPicPr>
-        <p:blipFill>
-          <a:blip r:embed="rId2">
-            <a:extLst>
-              <a:ext uri="{28A0092B-C50C-407E-A947-70E740481C1C}">
-                <a14:useLocalDpi xmlns:a14="http://schemas.microsoft.com/office/drawing/2010/main" val="0"/>
-              </a:ext>
-            </a:extLst>
-          </a:blip>
-          <a:stretch>
-            <a:fillRect/>
-          </a:stretch>
-        </p:blipFill>
-        <p:spPr>
-          <a:xfrm>
-            <a:off x="6172200" y="431116"/>
-            <a:ext cx="2857500" cy="571500"/>
-          </a:xfrm>
-          <a:prstGeom prst="rect">
-            <a:avLst/>
-          </a:prstGeom>
-        </p:spPr>
-      </p:pic>
       <p:sp>
         <p:nvSpPr>
           <p:cNvPr id="15" name="Date Placeholder 3"/>
@@ -3245,7 +3185,7 @@
   <p:timing>
     <p:tnLst>
       <p:par>
-        <p:cTn id="1" dur="indefinite" restart="never" nodeType="tmRoot"/>
+        <p:cTn xmlns:p14="http://schemas.microsoft.com/office/powerpoint/2010/main" id="1" dur="indefinite" restart="never" nodeType="tmRoot"/>
       </p:par>
     </p:tnLst>
   </p:timing>
@@ -3605,7 +3545,7 @@
   <p:timing>
     <p:tnLst>
       <p:par>
-        <p:cTn id="1" dur="indefinite" restart="never" nodeType="tmRoot"/>
+        <p:cTn xmlns:p14="http://schemas.microsoft.com/office/powerpoint/2010/main" id="1" dur="indefinite" restart="never" nodeType="tmRoot"/>
       </p:par>
     </p:tnLst>
   </p:timing>
@@ -4100,7 +4040,7 @@
   <p:timing>
     <p:tnLst>
       <p:par>
-        <p:cTn id="1" dur="indefinite" restart="never" nodeType="tmRoot"/>
+        <p:cTn xmlns:p14="http://schemas.microsoft.com/office/powerpoint/2010/main" id="1" dur="indefinite" restart="never" nodeType="tmRoot"/>
       </p:par>
     </p:tnLst>
   </p:timing>
@@ -4288,7 +4228,7 @@
   <p:timing>
     <p:tnLst>
       <p:par>
-        <p:cTn id="1" dur="indefinite" restart="never" nodeType="tmRoot"/>
+        <p:cTn xmlns:p14="http://schemas.microsoft.com/office/powerpoint/2010/main" id="1" dur="indefinite" restart="never" nodeType="tmRoot"/>
       </p:par>
     </p:tnLst>
   </p:timing>
@@ -4451,7 +4391,7 @@
   <p:timing>
     <p:tnLst>
       <p:par>
-        <p:cTn id="1" dur="indefinite" restart="never" nodeType="tmRoot"/>
+        <p:cTn xmlns:p14="http://schemas.microsoft.com/office/powerpoint/2010/main" id="1" dur="indefinite" restart="never" nodeType="tmRoot"/>
       </p:par>
     </p:tnLst>
   </p:timing>
@@ -4896,7 +4836,7 @@
   <p:timing>
     <p:tnLst>
       <p:par>
-        <p:cTn id="1" dur="indefinite" restart="never" nodeType="tmRoot"/>
+        <p:cTn xmlns:p14="http://schemas.microsoft.com/office/powerpoint/2010/main" id="1" dur="indefinite" restart="never" nodeType="tmRoot"/>
       </p:par>
     </p:tnLst>
   </p:timing>
@@ -5138,7 +5078,7 @@
   <p:timing>
     <p:tnLst>
       <p:par>
-        <p:cTn id="1" dur="indefinite" restart="never" nodeType="tmRoot"/>
+        <p:cTn xmlns:p14="http://schemas.microsoft.com/office/powerpoint/2010/main" id="1" dur="indefinite" restart="never" nodeType="tmRoot"/>
       </p:par>
     </p:tnLst>
   </p:timing>
@@ -5376,36 +5316,6 @@
           </a:p>
         </p:txBody>
       </p:sp>
-      <p:pic>
-        <p:nvPicPr>
-          <p:cNvPr id="9" name="Content Placeholder 3"/>
-          <p:cNvPicPr>
-            <a:picLocks noChangeAspect="1"/>
-          </p:cNvPicPr>
-          <p:nvPr userDrawn="1"/>
-        </p:nvPicPr>
-        <p:blipFill>
-          <a:blip r:embed="rId11">
-            <a:extLst>
-              <a:ext uri="{28A0092B-C50C-407E-A947-70E740481C1C}">
-                <a14:useLocalDpi xmlns:a14="http://schemas.microsoft.com/office/drawing/2010/main" val="0"/>
-              </a:ext>
-            </a:extLst>
-          </a:blip>
-          <a:stretch>
-            <a:fillRect/>
-          </a:stretch>
-        </p:blipFill>
-        <p:spPr>
-          <a:xfrm>
-            <a:off x="6172200" y="431116"/>
-            <a:ext cx="2857500" cy="571500"/>
-          </a:xfrm>
-          <a:prstGeom prst="rect">
-            <a:avLst/>
-          </a:prstGeom>
-        </p:spPr>
-      </p:pic>
       <p:sp>
         <p:nvSpPr>
           <p:cNvPr id="11" name="Date Placeholder 3"/>
@@ -5554,7 +5464,7 @@
   <p:timing>
     <p:tnLst>
       <p:par>
-        <p:cTn id="1" dur="indefinite" restart="never" nodeType="tmRoot"/>
+        <p:cTn xmlns:p14="http://schemas.microsoft.com/office/powerpoint/2010/main" id="1" dur="indefinite" restart="never" nodeType="tmRoot"/>
       </p:par>
     </p:tnLst>
   </p:timing>
@@ -5939,6 +5849,83 @@
               <a:rPr lang="en-US" dirty="0" err="1" smtClean="0"/>
               <a:t>Schuh</a:t>
             </a:r>
+            <a:r>
+              <a:rPr lang="en-US" dirty="0" smtClean="0"/>
+              <a:t>, updated by </a:t>
+            </a:r>
+            <a:r>
+              <a:rPr lang="en-US" dirty="0" smtClean="0"/>
+              <a:t>Andrew Hundt</a:t>
+            </a:r>
+            <a:endParaRPr lang="en-US" dirty="0"/>
+          </a:p>
+        </p:txBody>
+      </p:sp>
+      <p:sp>
+        <p:nvSpPr>
+          <p:cNvPr id="5" name="Footer Placeholder 3"/>
+          <p:cNvSpPr>
+            <a:spLocks noGrp="1"/>
+          </p:cNvSpPr>
+          <p:nvPr>
+            <p:ph type="ftr" sz="quarter" idx="3"/>
+          </p:nvPr>
+        </p:nvSpPr>
+        <p:spPr>
+          <a:xfrm>
+            <a:off x="1600200" y="6476999"/>
+            <a:ext cx="6548115" cy="274320"/>
+          </a:xfrm>
+        </p:spPr>
+        <p:txBody>
+          <a:bodyPr/>
+          <a:lstStyle/>
+          <a:p>
+            <a:pPr>
+              <a:tabLst>
+                <a:tab pos="6400800" algn="r"/>
+              </a:tabLst>
+            </a:pPr>
+            <a:r>
+              <a:rPr lang="en-US" dirty="0" smtClean="0"/>
+              <a:t>Copyright ©2011 University of Pennsylvania.  Copyright ©2013  Carnegie Mellon University.</a:t>
+            </a:r>
+            <a:endParaRPr lang="en-US" dirty="0"/>
+          </a:p>
+        </p:txBody>
+      </p:sp>
+      <p:sp>
+        <p:nvSpPr>
+          <p:cNvPr id="6" name="Date Placeholder 3"/>
+          <p:cNvSpPr>
+            <a:spLocks noGrp="1"/>
+          </p:cNvSpPr>
+          <p:nvPr>
+            <p:ph type="dt" sz="half" idx="2"/>
+          </p:nvPr>
+        </p:nvSpPr>
+        <p:spPr>
+          <a:xfrm>
+            <a:off x="457200" y="6476999"/>
+            <a:ext cx="990600" cy="274320"/>
+          </a:xfrm>
+        </p:spPr>
+        <p:txBody>
+          <a:bodyPr/>
+          <a:lstStyle/>
+          <a:p>
+            <a:r>
+              <a:rPr lang="en-US" dirty="0" smtClean="0"/>
+              <a:t>11/</a:t>
+            </a:r>
+            <a:r>
+              <a:rPr lang="en-US" dirty="0" smtClean="0"/>
+              <a:t>21/</a:t>
+            </a:r>
+            <a:r>
+              <a:rPr lang="en-US" dirty="0" smtClean="0"/>
+              <a:t>2013</a:t>
+            </a:r>
             <a:endParaRPr lang="en-US" dirty="0"/>
           </a:p>
         </p:txBody>
@@ -5956,7 +5943,7 @@
   <p:timing>
     <p:tnLst>
       <p:par>
-        <p:cTn id="1" dur="indefinite" restart="never" nodeType="tmRoot"/>
+        <p:cTn xmlns:p14="http://schemas.microsoft.com/office/powerpoint/2010/main" id="1" dur="indefinite" restart="never" nodeType="tmRoot"/>
       </p:par>
     </p:tnLst>
   </p:timing>
@@ -6237,7 +6224,7 @@
   <p:timing>
     <p:tnLst>
       <p:par>
-        <p:cTn id="1" dur="indefinite" restart="never" nodeType="tmRoot"/>
+        <p:cTn xmlns:p14="http://schemas.microsoft.com/office/powerpoint/2010/main" id="1" dur="indefinite" restart="never" nodeType="tmRoot"/>
       </p:par>
     </p:tnLst>
   </p:timing>
@@ -6303,7 +6290,11 @@
           <a:p>
             <a:r>
               <a:rPr lang="en-US" sz="2400" dirty="0" smtClean="0"/>
-              <a:t>Se the following environment variables:</a:t>
+              <a:t>Set </a:t>
+            </a:r>
+            <a:r>
+              <a:rPr lang="en-US" sz="2400" dirty="0" smtClean="0"/>
+              <a:t>the following environment variables:</a:t>
             </a:r>
           </a:p>
           <a:p>
@@ -6652,7 +6643,7 @@
   <p:timing>
     <p:tnLst>
       <p:par>
-        <p:cTn id="1" dur="indefinite" restart="never" nodeType="tmRoot"/>
+        <p:cTn xmlns:p14="http://schemas.microsoft.com/office/powerpoint/2010/main" id="1" dur="indefinite" restart="never" nodeType="tmRoot"/>
       </p:par>
     </p:tnLst>
   </p:timing>
@@ -6716,7 +6707,15 @@
           <a:p>
             <a:r>
               <a:rPr lang="en-US" dirty="0" smtClean="0"/>
-              <a:t>How do I create my own BASIS-conform project?</a:t>
+              <a:t>How do I create my own </a:t>
+            </a:r>
+            <a:r>
+              <a:rPr lang="en-US" dirty="0" smtClean="0"/>
+              <a:t>BASIS conforming project</a:t>
+            </a:r>
+            <a:r>
+              <a:rPr lang="en-US" dirty="0" smtClean="0"/>
+              <a:t>?</a:t>
             </a:r>
             <a:endParaRPr lang="en-US" dirty="0"/>
           </a:p>
@@ -6805,7 +6804,7 @@
   <p:timing>
     <p:tnLst>
       <p:par>
-        <p:cTn id="1" dur="indefinite" restart="never" nodeType="tmRoot"/>
+        <p:cTn xmlns:p14="http://schemas.microsoft.com/office/powerpoint/2010/main" id="1" dur="indefinite" restart="never" nodeType="tmRoot"/>
       </p:par>
     </p:tnLst>
   </p:timing>
@@ -7257,7 +7256,7 @@
   <p:timing>
     <p:tnLst>
       <p:par>
-        <p:cTn id="1" dur="indefinite" restart="never" nodeType="tmRoot"/>
+        <p:cTn xmlns:p14="http://schemas.microsoft.com/office/powerpoint/2010/main" id="1" dur="indefinite" restart="never" nodeType="tmRoot"/>
       </p:par>
     </p:tnLst>
   </p:timing>
@@ -7393,7 +7392,15 @@
           <a:p>
             <a:r>
               <a:rPr lang="en-US" sz="2400" dirty="0" smtClean="0"/>
-              <a:t>More details on the creation of a new BASIS project and its modification afterwards using the project tool of BASIS can be found on the Wiki of SBIA at:</a:t>
+              <a:t>More details on the creation of a new BASIS project and its modification afterwards using the project tool of BASIS can be found on the </a:t>
+            </a:r>
+            <a:r>
+              <a:rPr lang="en-US" sz="2400" dirty="0" smtClean="0"/>
+              <a:t>website of </a:t>
+            </a:r>
+            <a:r>
+              <a:rPr lang="en-US" sz="2400" dirty="0" smtClean="0"/>
+              <a:t>SBIA at:</a:t>
             </a:r>
           </a:p>
           <a:p>
@@ -7405,18 +7412,14 @@
               <a:rPr lang="en-US" sz="2000" dirty="0">
                 <a:hlinkClick r:id="rId3"/>
               </a:rPr>
-              <a:t>https://sbia-wiki.uphs.upenn.edu/wiki/index.php/BASIS_How-To:_</a:t>
+              <a:t>http://www.rad.upenn.edu/sbia/software/basis/</a:t>
             </a:r>
             <a:r>
               <a:rPr lang="en-US" sz="2000" dirty="0" smtClean="0">
                 <a:hlinkClick r:id="rId3"/>
               </a:rPr>
-              <a:t>Managing_a_BASIS_Project</a:t>
-            </a:r>
-            <a:endParaRPr lang="en-US" sz="2000" dirty="0" smtClean="0"/>
-          </a:p>
-          <a:p>
-            <a:pPr lvl="1"/>
+              <a:t>manual.html</a:t>
+            </a:r>
             <a:endParaRPr lang="en-US" sz="2000" dirty="0" smtClean="0"/>
           </a:p>
           <a:p>
@@ -7437,7 +7440,7 @@
   <p:timing>
     <p:tnLst>
       <p:par>
-        <p:cTn id="1" dur="indefinite" restart="never" nodeType="tmRoot"/>
+        <p:cTn xmlns:p14="http://schemas.microsoft.com/office/powerpoint/2010/main" id="1" dur="indefinite" restart="never" nodeType="tmRoot"/>
       </p:par>
     </p:tnLst>
   </p:timing>
@@ -7590,7 +7593,7 @@
   <p:timing>
     <p:tnLst>
       <p:par>
-        <p:cTn id="1" dur="indefinite" restart="never" nodeType="tmRoot"/>
+        <p:cTn xmlns:p14="http://schemas.microsoft.com/office/powerpoint/2010/main" id="1" dur="indefinite" restart="never" nodeType="tmRoot"/>
       </p:par>
     </p:tnLst>
   </p:timing>
@@ -7684,8 +7687,14 @@
               <a:t>INSTALL-basis.txt</a:t>
             </a:r>
             <a:r>
+              <a:rPr lang="en-US" sz="2400" dirty="0" smtClean="0">
+                <a:hlinkClick r:id="rId3"/>
+              </a:rPr>
+              <a:t> </a:t>
+            </a:r>
+            <a:r>
               <a:rPr lang="en-US" sz="2400" dirty="0" smtClean="0"/>
-              <a:t> which is part of BASIS summarizes these steps.</a:t>
+              <a:t>which is part of BASIS summarizes these steps.</a:t>
             </a:r>
           </a:p>
           <a:p>
@@ -7934,7 +7943,7 @@
   <p:timing>
     <p:tnLst>
       <p:par>
-        <p:cTn id="1" dur="indefinite" restart="never" nodeType="tmRoot"/>
+        <p:cTn xmlns:p14="http://schemas.microsoft.com/office/powerpoint/2010/main" id="1" dur="indefinite" restart="never" nodeType="tmRoot"/>
       </p:par>
     </p:tnLst>
   </p:timing>
@@ -8099,7 +8108,7 @@
   <p:timing>
     <p:tnLst>
       <p:par>
-        <p:cTn id="1" dur="indefinite" restart="never" nodeType="tmRoot"/>
+        <p:cTn xmlns:p14="http://schemas.microsoft.com/office/powerpoint/2010/main" id="1" dur="indefinite" restart="never" nodeType="tmRoot"/>
       </p:par>
     </p:tnLst>
   </p:timing>
@@ -8578,7 +8587,7 @@
   <p:timing>
     <p:tnLst>
       <p:par>
-        <p:cTn id="1" dur="indefinite" restart="never" nodeType="tmRoot"/>
+        <p:cTn xmlns:p14="http://schemas.microsoft.com/office/powerpoint/2010/main" id="1" dur="indefinite" restart="never" nodeType="tmRoot"/>
       </p:par>
     </p:tnLst>
   </p:timing>
@@ -9000,7 +9009,7 @@
   <p:timing>
     <p:tnLst>
       <p:par>
-        <p:cTn id="1" dur="indefinite" restart="never" nodeType="tmRoot"/>
+        <p:cTn xmlns:p14="http://schemas.microsoft.com/office/powerpoint/2010/main" id="1" dur="indefinite" restart="never" nodeType="tmRoot"/>
       </p:par>
     </p:tnLst>
   </p:timing>
@@ -9170,7 +9179,7 @@
           <a:lstStyle/>
           <a:p>
             <a:r>
-              <a:rPr lang="en-US" smtClean="0"/>
+              <a:rPr lang="en-US" dirty="0" smtClean="0"/>
               <a:t>Getting Started        Copyright (c) 2011 University of Pennsylvania. All rights reserved.</a:t>
             </a:r>
             <a:endParaRPr lang="en-US" dirty="0"/>
@@ -9214,7 +9223,7 @@
   <p:timing>
     <p:tnLst>
       <p:par>
-        <p:cTn id="1" dur="indefinite" restart="never" nodeType="tmRoot"/>
+        <p:cTn xmlns:p14="http://schemas.microsoft.com/office/powerpoint/2010/main" id="1" dur="indefinite" restart="never" nodeType="tmRoot"/>
       </p:par>
     </p:tnLst>
   </p:timing>
@@ -9586,7 +9595,7 @@
   <p:timing>
     <p:tnLst>
       <p:par>
-        <p:cTn id="1" dur="indefinite" restart="never" nodeType="tmRoot"/>
+        <p:cTn xmlns:p14="http://schemas.microsoft.com/office/powerpoint/2010/main" id="1" dur="indefinite" restart="never" nodeType="tmRoot"/>
       </p:par>
     </p:tnLst>
   </p:timing>
@@ -9716,7 +9725,7 @@
         <p:spPr/>
         <p:txBody>
           <a:bodyPr>
-            <a:normAutofit fontScale="77500" lnSpcReduction="20000"/>
+            <a:normAutofit fontScale="85000" lnSpcReduction="20000"/>
           </a:bodyPr>
           <a:lstStyle/>
           <a:p>
@@ -10043,7 +10052,7 @@
   <p:timing>
     <p:tnLst>
       <p:par>
-        <p:cTn id="1" dur="indefinite" restart="never" nodeType="tmRoot"/>
+        <p:cTn xmlns:p14="http://schemas.microsoft.com/office/powerpoint/2010/main" id="1" dur="indefinite" restart="never" nodeType="tmRoot"/>
       </p:par>
     </p:tnLst>
   </p:timing>
@@ -10196,7 +10205,7 @@
   <p:timing>
     <p:tnLst>
       <p:par>
-        <p:cTn id="1" dur="indefinite" restart="never" nodeType="tmRoot"/>
+        <p:cTn xmlns:p14="http://schemas.microsoft.com/office/powerpoint/2010/main" id="1" dur="indefinite" restart="never" nodeType="tmRoot"/>
       </p:par>
     </p:tnLst>
   </p:timing>
@@ -10551,7 +10560,7 @@
   <p:timing>
     <p:tnLst>
       <p:par>
-        <p:cTn id="1" dur="indefinite" restart="never" nodeType="tmRoot"/>
+        <p:cTn xmlns:p14="http://schemas.microsoft.com/office/powerpoint/2010/main" id="1" dur="indefinite" restart="never" nodeType="tmRoot"/>
       </p:par>
     </p:tnLst>
   </p:timing>
@@ -11001,7 +11010,7 @@
   <p:timing>
     <p:tnLst>
       <p:par>
-        <p:cTn id="1" dur="indefinite" restart="never" nodeType="tmRoot"/>
+        <p:cTn xmlns:p14="http://schemas.microsoft.com/office/powerpoint/2010/main" id="1" dur="indefinite" restart="never" nodeType="tmRoot"/>
       </p:par>
     </p:tnLst>
   </p:timing>
@@ -11331,7 +11340,7 @@
   <p:timing>
     <p:tnLst>
       <p:par>
-        <p:cTn id="1" dur="indefinite" restart="never" nodeType="tmRoot"/>
+        <p:cTn xmlns:p14="http://schemas.microsoft.com/office/powerpoint/2010/main" id="1" dur="indefinite" restart="never" nodeType="tmRoot"/>
       </p:par>
     </p:tnLst>
   </p:timing>
@@ -11631,7 +11640,7 @@
   <p:timing>
     <p:tnLst>
       <p:par>
-        <p:cTn id="1" dur="indefinite" restart="never" nodeType="tmRoot"/>
+        <p:cTn xmlns:p14="http://schemas.microsoft.com/office/powerpoint/2010/main" id="1" dur="indefinite" restart="never" nodeType="tmRoot"/>
       </p:par>
     </p:tnLst>
   </p:timing>
@@ -11890,7 +11899,7 @@
   <p:timing>
     <p:tnLst>
       <p:par>
-        <p:cTn id="1" dur="indefinite" restart="never" nodeType="tmRoot"/>
+        <p:cTn xmlns:p14="http://schemas.microsoft.com/office/powerpoint/2010/main" id="1" dur="indefinite" restart="never" nodeType="tmRoot"/>
       </p:par>
     </p:tnLst>
   </p:timing>
@@ -11939,52 +11948,6 @@
       </p:sp>
       <p:sp>
         <p:nvSpPr>
-          <p:cNvPr id="3" name="Date Placeholder 2"/>
-          <p:cNvSpPr>
-            <a:spLocks noGrp="1"/>
-          </p:cNvSpPr>
-          <p:nvPr>
-            <p:ph type="dt" sz="half" idx="2"/>
-          </p:nvPr>
-        </p:nvSpPr>
-        <p:spPr/>
-        <p:txBody>
-          <a:bodyPr/>
-          <a:lstStyle/>
-          <a:p>
-            <a:r>
-              <a:rPr lang="en-US" smtClean="0"/>
-              <a:t>9/30/2011</a:t>
-            </a:r>
-            <a:endParaRPr lang="en-US"/>
-          </a:p>
-        </p:txBody>
-      </p:sp>
-      <p:sp>
-        <p:nvSpPr>
-          <p:cNvPr id="4" name="Footer Placeholder 3"/>
-          <p:cNvSpPr>
-            <a:spLocks noGrp="1"/>
-          </p:cNvSpPr>
-          <p:nvPr>
-            <p:ph type="ftr" sz="quarter" idx="3"/>
-          </p:nvPr>
-        </p:nvSpPr>
-        <p:spPr/>
-        <p:txBody>
-          <a:bodyPr/>
-          <a:lstStyle/>
-          <a:p>
-            <a:r>
-              <a:rPr lang="en-US" smtClean="0"/>
-              <a:t>BASIS Introduction	Copyright (c) 2011 University of Pennsylvania. All rights reserved.</a:t>
-            </a:r>
-            <a:endParaRPr lang="en-US" dirty="0"/>
-          </a:p>
-        </p:txBody>
-      </p:sp>
-      <p:sp>
-        <p:nvSpPr>
           <p:cNvPr id="5" name="Slide Number Placeholder 4"/>
           <p:cNvSpPr>
             <a:spLocks noGrp="1"/>
@@ -12072,8 +12035,14 @@
               <a:t>BASIS Tutorial</a:t>
             </a:r>
             <a:r>
+              <a:rPr lang="en-US" sz="2400" dirty="0" smtClean="0">
+                <a:hlinkClick r:id="rId2"/>
+              </a:rPr>
+              <a:t> </a:t>
+            </a:r>
+            <a:r>
               <a:rPr lang="en-US" sz="2400" dirty="0" smtClean="0"/>
-              <a:t> which gives more details about each of the steps described here.</a:t>
+              <a:t>which gives more details about each of the steps described here.</a:t>
             </a:r>
             <a:endParaRPr lang="en-US" sz="2400" dirty="0"/>
           </a:p>
@@ -12092,7 +12061,7 @@
   <p:timing>
     <p:tnLst>
       <p:par>
-        <p:cTn id="1" dur="indefinite" restart="never" nodeType="tmRoot"/>
+        <p:cTn xmlns:p14="http://schemas.microsoft.com/office/powerpoint/2010/main" id="1" dur="indefinite" restart="never" nodeType="tmRoot"/>
       </p:par>
     </p:tnLst>
   </p:timing>
@@ -12164,29 +12133,6 @@
       </p:sp>
       <p:sp>
         <p:nvSpPr>
-          <p:cNvPr id="4" name="Date Placeholder 3"/>
-          <p:cNvSpPr>
-            <a:spLocks noGrp="1"/>
-          </p:cNvSpPr>
-          <p:nvPr>
-            <p:ph type="dt" sz="half" idx="2"/>
-          </p:nvPr>
-        </p:nvSpPr>
-        <p:spPr/>
-        <p:txBody>
-          <a:bodyPr/>
-          <a:lstStyle/>
-          <a:p>
-            <a:r>
-              <a:rPr lang="en-US" smtClean="0"/>
-              <a:t>10/21/2011</a:t>
-            </a:r>
-            <a:endParaRPr lang="en-US" dirty="0"/>
-          </a:p>
-        </p:txBody>
-      </p:sp>
-      <p:sp>
-        <p:nvSpPr>
           <p:cNvPr id="5" name="Footer Placeholder 4"/>
           <p:cNvSpPr>
             <a:spLocks noGrp="1"/>
@@ -12245,7 +12191,7 @@
   <p:timing>
     <p:tnLst>
       <p:par>
-        <p:cTn id="1" dur="indefinite" restart="never" nodeType="tmRoot"/>
+        <p:cTn xmlns:p14="http://schemas.microsoft.com/office/powerpoint/2010/main" id="1" dur="indefinite" restart="never" nodeType="tmRoot"/>
       </p:par>
     </p:tnLst>
   </p:timing>
@@ -12305,13 +12251,25 @@
         <p:spPr/>
         <p:txBody>
           <a:bodyPr>
-            <a:normAutofit fontScale="92500" lnSpcReduction="10000"/>
+            <a:normAutofit/>
           </a:bodyPr>
           <a:lstStyle/>
           <a:p>
             <a:r>
               <a:rPr lang="en-US" sz="2400" dirty="0" smtClean="0"/>
-              <a:t>In this quick start guide, you will first of all install BASIS in your system.</a:t>
+              <a:t>First install </a:t>
+            </a:r>
+            <a:r>
+              <a:rPr lang="en-US" sz="2400" dirty="0" smtClean="0"/>
+              <a:t>BASIS </a:t>
+            </a:r>
+            <a:r>
+              <a:rPr lang="en-US" sz="2400" dirty="0" smtClean="0"/>
+              <a:t>on your </a:t>
+            </a:r>
+            <a:r>
+              <a:rPr lang="en-US" sz="2400" dirty="0" smtClean="0"/>
+              <a:t>system.</a:t>
             </a:r>
           </a:p>
           <a:p>
@@ -12320,7 +12278,35 @@
           <a:p>
             <a:r>
               <a:rPr lang="en-US" sz="2400" dirty="0" smtClean="0"/>
-              <a:t>Then, you will use so-called project tool of BASIS to create a new project.</a:t>
+              <a:t>Use the </a:t>
+            </a:r>
+            <a:r>
+              <a:rPr lang="en-US" sz="2400" dirty="0" smtClean="0"/>
+              <a:t>so-</a:t>
+            </a:r>
+            <a:r>
+              <a:rPr lang="en-US" sz="2400" dirty="0" smtClean="0"/>
+              <a:t>called “</a:t>
+            </a:r>
+            <a:r>
+              <a:rPr lang="en-US" sz="2400" dirty="0" err="1" smtClean="0"/>
+              <a:t>basisproject</a:t>
+            </a:r>
+            <a:r>
+              <a:rPr lang="en-US" sz="2400" dirty="0" smtClean="0"/>
+              <a:t>” command line tool to </a:t>
+            </a:r>
+            <a:r>
+              <a:rPr lang="en-US" sz="2400" dirty="0" smtClean="0"/>
+              <a:t>create a </a:t>
+            </a:r>
+            <a:r>
+              <a:rPr lang="en-US" sz="2400" dirty="0" smtClean="0"/>
+              <a:t>new empty </a:t>
+            </a:r>
+            <a:r>
+              <a:rPr lang="en-US" sz="2400" dirty="0" smtClean="0"/>
+              <a:t>project.</a:t>
             </a:r>
           </a:p>
           <a:p>
@@ -12329,7 +12315,11 @@
           <a:p>
             <a:r>
               <a:rPr lang="en-US" sz="2400" dirty="0" smtClean="0"/>
-              <a:t>After you created a new and empty project, you will add some example source files and edit the build configuration files to build the executable and library files.</a:t>
+              <a:t>Add </a:t>
+            </a:r>
+            <a:r>
+              <a:rPr lang="en-US" sz="2400" dirty="0" smtClean="0"/>
+              <a:t>some example source files and edit the build configuration files to build the executable and library files.</a:t>
             </a:r>
           </a:p>
           <a:p>
@@ -12338,7 +12328,15 @@
           <a:p>
             <a:r>
               <a:rPr lang="en-US" sz="2400" dirty="0" smtClean="0"/>
-              <a:t>Finally, you will build and test the example project.</a:t>
+              <a:t>Finally, </a:t>
+            </a:r>
+            <a:r>
+              <a:rPr lang="en-US" sz="2400" dirty="0" smtClean="0"/>
+              <a:t>build </a:t>
+            </a:r>
+            <a:r>
+              <a:rPr lang="en-US" sz="2400" dirty="0" smtClean="0"/>
+              <a:t>and test the example project.</a:t>
             </a:r>
           </a:p>
           <a:p>
@@ -12363,52 +12361,6 @@
               <a:rPr lang="en-US" sz="2400" dirty="0" smtClean="0"/>
               <a:t>. </a:t>
             </a:r>
-          </a:p>
-        </p:txBody>
-      </p:sp>
-      <p:sp>
-        <p:nvSpPr>
-          <p:cNvPr id="4" name="Date Placeholder 3"/>
-          <p:cNvSpPr>
-            <a:spLocks noGrp="1"/>
-          </p:cNvSpPr>
-          <p:nvPr>
-            <p:ph type="dt" sz="half" idx="2"/>
-          </p:nvPr>
-        </p:nvSpPr>
-        <p:spPr/>
-        <p:txBody>
-          <a:bodyPr/>
-          <a:lstStyle/>
-          <a:p>
-            <a:r>
-              <a:rPr lang="en-US" smtClean="0"/>
-              <a:t>10/21/2011</a:t>
-            </a:r>
-            <a:endParaRPr lang="en-US" dirty="0"/>
-          </a:p>
-        </p:txBody>
-      </p:sp>
-      <p:sp>
-        <p:nvSpPr>
-          <p:cNvPr id="5" name="Footer Placeholder 4"/>
-          <p:cNvSpPr>
-            <a:spLocks noGrp="1"/>
-          </p:cNvSpPr>
-          <p:nvPr>
-            <p:ph type="ftr" sz="quarter" idx="3"/>
-          </p:nvPr>
-        </p:nvSpPr>
-        <p:spPr/>
-        <p:txBody>
-          <a:bodyPr/>
-          <a:lstStyle/>
-          <a:p>
-            <a:r>
-              <a:rPr lang="en-US" smtClean="0"/>
-              <a:t>Getting Started        Copyright (c) 2011 University of Pennsylvania. All rights reserved.</a:t>
-            </a:r>
-            <a:endParaRPr lang="en-US" dirty="0"/>
           </a:p>
         </p:txBody>
       </p:sp>
@@ -12449,7 +12401,7 @@
   <p:timing>
     <p:tnLst>
       <p:par>
-        <p:cTn id="1" dur="indefinite" restart="never" nodeType="tmRoot"/>
+        <p:cTn xmlns:p14="http://schemas.microsoft.com/office/powerpoint/2010/main" id="1" dur="indefinite" restart="never" nodeType="tmRoot"/>
       </p:par>
     </p:tnLst>
   </p:timing>
@@ -12509,7 +12461,7 @@
         <p:spPr/>
         <p:txBody>
           <a:bodyPr>
-            <a:normAutofit lnSpcReduction="10000"/>
+            <a:normAutofit fontScale="92500" lnSpcReduction="10000"/>
           </a:bodyPr>
           <a:lstStyle/>
           <a:p>
@@ -12539,8 +12491,27 @@
             </a:r>
             <a:r>
               <a:rPr lang="en-US" sz="2400" dirty="0" smtClean="0"/>
-              <a:t>uide, you need to have a Unix-like operating system. Specifically, we focus on Linux, but it has also been tested on Mac OS X.</a:t>
-            </a:r>
+              <a:t>uide, you need to have a Unix-like operating system</a:t>
+            </a:r>
+            <a:r>
+              <a:rPr lang="en-US" sz="2400" dirty="0" smtClean="0"/>
+              <a:t>.</a:t>
+            </a:r>
+          </a:p>
+          <a:p>
+            <a:pPr lvl="1"/>
+            <a:r>
+              <a:rPr lang="en-US" sz="2000" dirty="0" smtClean="0"/>
+              <a:t>Linux</a:t>
+            </a:r>
+          </a:p>
+          <a:p>
+            <a:pPr lvl="1"/>
+            <a:r>
+              <a:rPr lang="en-US" sz="2000" dirty="0" smtClean="0"/>
+              <a:t>Mac OS X</a:t>
+            </a:r>
+            <a:endParaRPr lang="en-US" sz="2000" dirty="0" smtClean="0"/>
           </a:p>
           <a:p>
             <a:endParaRPr lang="en-US" sz="2400" dirty="0"/>
@@ -12599,52 +12570,6 @@
               <a:rPr lang="en-US" sz="2000" dirty="0" smtClean="0"/>
               <a:t>This would also allow you to use the BASIS tools which are not available for native Windows.</a:t>
             </a:r>
-          </a:p>
-        </p:txBody>
-      </p:sp>
-      <p:sp>
-        <p:nvSpPr>
-          <p:cNvPr id="4" name="Date Placeholder 3"/>
-          <p:cNvSpPr>
-            <a:spLocks noGrp="1"/>
-          </p:cNvSpPr>
-          <p:nvPr>
-            <p:ph type="dt" sz="half" idx="2"/>
-          </p:nvPr>
-        </p:nvSpPr>
-        <p:spPr/>
-        <p:txBody>
-          <a:bodyPr/>
-          <a:lstStyle/>
-          <a:p>
-            <a:r>
-              <a:rPr lang="en-US" smtClean="0"/>
-              <a:t>10/21/2011</a:t>
-            </a:r>
-            <a:endParaRPr lang="en-US" dirty="0"/>
-          </a:p>
-        </p:txBody>
-      </p:sp>
-      <p:sp>
-        <p:nvSpPr>
-          <p:cNvPr id="5" name="Footer Placeholder 4"/>
-          <p:cNvSpPr>
-            <a:spLocks noGrp="1"/>
-          </p:cNvSpPr>
-          <p:nvPr>
-            <p:ph type="ftr" sz="quarter" idx="3"/>
-          </p:nvPr>
-        </p:nvSpPr>
-        <p:spPr/>
-        <p:txBody>
-          <a:bodyPr/>
-          <a:lstStyle/>
-          <a:p>
-            <a:r>
-              <a:rPr lang="en-US" smtClean="0"/>
-              <a:t>Getting Started        Copyright (c) 2011 University of Pennsylvania. All rights reserved.</a:t>
-            </a:r>
-            <a:endParaRPr lang="en-US" dirty="0"/>
           </a:p>
         </p:txBody>
       </p:sp>
@@ -12685,7 +12610,7 @@
   <p:timing>
     <p:tnLst>
       <p:par>
-        <p:cTn id="1" dur="indefinite" restart="never" nodeType="tmRoot"/>
+        <p:cTn xmlns:p14="http://schemas.microsoft.com/office/powerpoint/2010/main" id="1" dur="indefinite" restart="never" nodeType="tmRoot"/>
       </p:par>
     </p:tnLst>
   </p:timing>
@@ -12838,7 +12763,7 @@
   <p:timing>
     <p:tnLst>
       <p:par>
-        <p:cTn id="1" dur="indefinite" restart="never" nodeType="tmRoot"/>
+        <p:cTn xmlns:p14="http://schemas.microsoft.com/office/powerpoint/2010/main" id="1" dur="indefinite" restart="never" nodeType="tmRoot"/>
       </p:par>
     </p:tnLst>
   </p:timing>
@@ -12904,8 +12829,13 @@
           <a:p>
             <a:r>
               <a:rPr lang="en-US" sz="2400" dirty="0" smtClean="0"/>
-              <a:t>Download the source code of BASIS 0.1:</a:t>
-            </a:r>
+              <a:t>Download the source code of </a:t>
+            </a:r>
+            <a:r>
+              <a:rPr lang="en-US" sz="2400" dirty="0" smtClean="0"/>
+              <a:t>BASIS:</a:t>
+            </a:r>
+            <a:endParaRPr lang="en-US" sz="2400" dirty="0" smtClean="0"/>
           </a:p>
           <a:p>
             <a:endParaRPr lang="en-US" sz="2400" dirty="0" smtClean="0"/>
@@ -12971,46 +12901,67 @@
               <a:buChar char="Ø"/>
             </a:pPr>
             <a:r>
+              <a:rPr lang="en-US" sz="1600" dirty="0" err="1">
+                <a:latin typeface="Courier New" pitchFamily="49" charset="0"/>
+                <a:cs typeface="Courier New" pitchFamily="49" charset="0"/>
+              </a:rPr>
+              <a:t>g</a:t>
+            </a:r>
+            <a:r>
               <a:rPr lang="en-US" sz="1600" dirty="0" err="1" smtClean="0">
                 <a:latin typeface="Courier New" pitchFamily="49" charset="0"/>
                 <a:cs typeface="Courier New" pitchFamily="49" charset="0"/>
               </a:rPr>
-              <a:t>svn</a:t>
+              <a:t>it</a:t>
             </a:r>
             <a:r>
               <a:rPr lang="en-US" sz="1600" dirty="0" smtClean="0">
                 <a:latin typeface="Courier New" pitchFamily="49" charset="0"/>
                 <a:cs typeface="Courier New" pitchFamily="49" charset="0"/>
               </a:rPr>
-              <a:t> export</a:t>
-            </a:r>
-            <a:r>
-              <a:rPr lang="en-US" sz="1700" dirty="0" smtClean="0">
-                <a:latin typeface="Courier New" pitchFamily="49" charset="0"/>
-                <a:cs typeface="Courier New" pitchFamily="49" charset="0"/>
-              </a:rPr>
-              <a:t/>
-            </a:r>
-            <a:br>
-              <a:rPr lang="en-US" sz="1700" dirty="0" smtClean="0">
-                <a:latin typeface="Courier New" pitchFamily="49" charset="0"/>
-                <a:cs typeface="Courier New" pitchFamily="49" charset="0"/>
-              </a:rPr>
-            </a:br>
-            <a:r>
-              <a:rPr lang="en-US" sz="1500" dirty="0" smtClean="0">
-                <a:latin typeface="Courier New" pitchFamily="49" charset="0"/>
-                <a:cs typeface="Courier New" pitchFamily="49" charset="0"/>
-                <a:hlinkClick r:id="rId3"/>
-              </a:rPr>
-              <a:t>https://sbia-svn.uphs.upenn.edu/projects/BASIS/tags/basis-0.1.6</a:t>
-            </a:r>
-            <a:r>
-              <a:rPr lang="en-US" sz="1500" dirty="0" smtClean="0">
-                <a:latin typeface="Courier New" pitchFamily="49" charset="0"/>
-                <a:cs typeface="Courier New" pitchFamily="49" charset="0"/>
-              </a:rPr>
-              <a:t> basis-0.1</a:t>
+              <a:t> clone https</a:t>
+            </a:r>
+            <a:r>
+              <a:rPr lang="en-US" sz="1600" dirty="0">
+                <a:latin typeface="Courier New" pitchFamily="49" charset="0"/>
+                <a:cs typeface="Courier New" pitchFamily="49" charset="0"/>
+              </a:rPr>
+              <a:t>://</a:t>
+            </a:r>
+            <a:r>
+              <a:rPr lang="en-US" sz="1600" dirty="0" err="1">
+                <a:latin typeface="Courier New" pitchFamily="49" charset="0"/>
+                <a:cs typeface="Courier New" pitchFamily="49" charset="0"/>
+              </a:rPr>
+              <a:t>github.com</a:t>
+            </a:r>
+            <a:r>
+              <a:rPr lang="en-US" sz="1600" dirty="0">
+                <a:latin typeface="Courier New" pitchFamily="49" charset="0"/>
+                <a:cs typeface="Courier New" pitchFamily="49" charset="0"/>
+              </a:rPr>
+              <a:t>/</a:t>
+            </a:r>
+            <a:r>
+              <a:rPr lang="en-US" sz="1600" dirty="0" err="1">
+                <a:latin typeface="Courier New" pitchFamily="49" charset="0"/>
+                <a:cs typeface="Courier New" pitchFamily="49" charset="0"/>
+              </a:rPr>
+              <a:t>schuhschuh</a:t>
+            </a:r>
+            <a:r>
+              <a:rPr lang="en-US" sz="1600" dirty="0">
+                <a:latin typeface="Courier New" pitchFamily="49" charset="0"/>
+                <a:cs typeface="Courier New" pitchFamily="49" charset="0"/>
+              </a:rPr>
+              <a:t>/</a:t>
+            </a:r>
+            <a:r>
+              <a:rPr lang="en-US" sz="1600" dirty="0" err="1">
+                <a:latin typeface="Courier New" pitchFamily="49" charset="0"/>
+                <a:cs typeface="Courier New" pitchFamily="49" charset="0"/>
+              </a:rPr>
+              <a:t>cmake-basis.git</a:t>
             </a:r>
             <a:endParaRPr lang="en-US" sz="1500" dirty="0">
               <a:latin typeface="Courier New" pitchFamily="49" charset="0"/>
@@ -13102,7 +13053,7 @@
   <p:timing>
     <p:tnLst>
       <p:par>
-        <p:cTn id="1" dur="indefinite" restart="never" nodeType="tmRoot"/>
+        <p:cTn xmlns:p14="http://schemas.microsoft.com/office/powerpoint/2010/main" id="1" dur="indefinite" restart="never" nodeType="tmRoot"/>
       </p:par>
     </p:tnLst>
   </p:timing>
@@ -13216,7 +13167,21 @@
                 <a:latin typeface="Courier New" pitchFamily="49" charset="0"/>
                 <a:cs typeface="Courier New" pitchFamily="49" charset="0"/>
               </a:rPr>
-              <a:t> basis-0.1-build</a:t>
+              <a:t> </a:t>
+            </a:r>
+            <a:r>
+              <a:rPr lang="en-US" sz="1600" dirty="0" smtClean="0">
+                <a:latin typeface="Courier New" pitchFamily="49" charset="0"/>
+                <a:cs typeface="Courier New" pitchFamily="49" charset="0"/>
+              </a:rPr>
+              <a:t>basis-</a:t>
+            </a:r>
+            <a:r>
+              <a:rPr lang="en-US" sz="1600" dirty="0" smtClean="0">
+                <a:latin typeface="Courier New" pitchFamily="49" charset="0"/>
+                <a:cs typeface="Courier New" pitchFamily="49" charset="0"/>
+              </a:rPr>
+              <a:t>build</a:t>
             </a:r>
           </a:p>
           <a:p>
@@ -13229,7 +13194,21 @@
                 <a:latin typeface="Courier New" pitchFamily="49" charset="0"/>
                 <a:cs typeface="Courier New" pitchFamily="49" charset="0"/>
               </a:rPr>
-              <a:t>cd basis-0.1-build</a:t>
+              <a:t>cd </a:t>
+            </a:r>
+            <a:r>
+              <a:rPr lang="en-US" sz="1600" dirty="0" smtClean="0">
+                <a:latin typeface="Courier New" pitchFamily="49" charset="0"/>
+                <a:cs typeface="Courier New" pitchFamily="49" charset="0"/>
+              </a:rPr>
+              <a:t>basis-</a:t>
+            </a:r>
+            <a:r>
+              <a:rPr lang="en-US" sz="1600" dirty="0" smtClean="0">
+                <a:latin typeface="Courier New" pitchFamily="49" charset="0"/>
+                <a:cs typeface="Courier New" pitchFamily="49" charset="0"/>
+              </a:rPr>
+              <a:t>build</a:t>
             </a:r>
           </a:p>
           <a:p>
@@ -13256,8 +13235,19 @@
                 <a:latin typeface="Courier New" pitchFamily="49" charset="0"/>
                 <a:cs typeface="Courier New" pitchFamily="49" charset="0"/>
               </a:rPr>
-              <a:t> ../basis-0.1</a:t>
-            </a:r>
+              <a:t> ../</a:t>
+            </a:r>
+            <a:r>
+              <a:rPr lang="en-US" sz="1600" dirty="0" smtClean="0">
+                <a:latin typeface="Courier New" pitchFamily="49" charset="0"/>
+                <a:cs typeface="Courier New" pitchFamily="49" charset="0"/>
+              </a:rPr>
+              <a:t>basis</a:t>
+            </a:r>
+            <a:endParaRPr lang="en-US" sz="1600" dirty="0" smtClean="0">
+              <a:latin typeface="Courier New" pitchFamily="49" charset="0"/>
+              <a:cs typeface="Courier New" pitchFamily="49" charset="0"/>
+            </a:endParaRPr>
           </a:p>
           <a:p>
             <a:pPr lvl="1">
@@ -13489,7 +13479,7 @@
   <p:timing>
     <p:tnLst>
       <p:par>
-        <p:cTn id="1" dur="indefinite" restart="never" nodeType="tmRoot"/>
+        <p:cTn xmlns:p14="http://schemas.microsoft.com/office/powerpoint/2010/main" id="1" dur="indefinite" restart="never" nodeType="tmRoot"/>
       </p:par>
     </p:tnLst>
   </p:timing>
@@ -13691,7 +13681,7 @@
   <p:timing>
     <p:tnLst>
       <p:par>
-        <p:cTn id="1" dur="indefinite" restart="never" nodeType="tmRoot"/>
+        <p:cTn xmlns:p14="http://schemas.microsoft.com/office/powerpoint/2010/main" id="1" dur="indefinite" restart="never" nodeType="tmRoot"/>
       </p:par>
     </p:tnLst>
   </p:timing>

</xml_diff>

<commit_message>
Issue #237 Updated Getting Started Tutorial and Quick Start Guide to be more current and reference the git repository rather than the older SVN repository.
</commit_message>
<xml_diff>
--- a/doc/tutorials/BASIS Quick Start Guide - 01 Getting Started.pptx
+++ b/doc/tutorials/BASIS Quick Start Guide - 01 Getting Started.pptx
@@ -12,7 +12,7 @@
     <p:sldId id="257" r:id="rId3"/>
     <p:sldId id="260" r:id="rId4"/>
     <p:sldId id="259" r:id="rId5"/>
-    <p:sldId id="314" r:id="rId6"/>
+    <p:sldId id="332" r:id="rId6"/>
     <p:sldId id="285" r:id="rId7"/>
     <p:sldId id="316" r:id="rId8"/>
     <p:sldId id="329" r:id="rId9"/>
@@ -5919,8 +5919,16 @@
               <a:t>11/</a:t>
             </a:r>
             <a:r>
+              <a:rPr lang="en-US" dirty="0"/>
+              <a:t>1</a:t>
+            </a:r>
+            <a:r>
               <a:rPr lang="en-US" dirty="0" smtClean="0"/>
-              <a:t>21/</a:t>
+              <a:t>1</a:t>
+            </a:r>
+            <a:r>
+              <a:rPr lang="en-US" dirty="0" smtClean="0"/>
+              <a:t>/</a:t>
             </a:r>
             <a:r>
               <a:rPr lang="en-US" dirty="0" smtClean="0"/>
@@ -5930,6 +5938,36 @@
           </a:p>
         </p:txBody>
       </p:sp>
+      <p:pic>
+        <p:nvPicPr>
+          <p:cNvPr id="7" name="Content Placeholder 3"/>
+          <p:cNvPicPr>
+            <a:picLocks noChangeAspect="1"/>
+          </p:cNvPicPr>
+          <p:nvPr/>
+        </p:nvPicPr>
+        <p:blipFill>
+          <a:blip r:embed="rId2">
+            <a:extLst>
+              <a:ext uri="{28A0092B-C50C-407E-A947-70E740481C1C}">
+                <a14:useLocalDpi xmlns:a14="http://schemas.microsoft.com/office/drawing/2010/main" val="0"/>
+              </a:ext>
+            </a:extLst>
+          </a:blip>
+          <a:stretch>
+            <a:fillRect/>
+          </a:stretch>
+        </p:blipFill>
+        <p:spPr>
+          <a:xfrm>
+            <a:off x="6590583" y="5394722"/>
+            <a:ext cx="2324100" cy="464820"/>
+          </a:xfrm>
+          <a:prstGeom prst="rect">
+            <a:avLst/>
+          </a:prstGeom>
+        </p:spPr>
+      </p:pic>
     </p:spTree>
     <p:extLst>
       <p:ext uri="{BB962C8B-B14F-4D97-AF65-F5344CB8AC3E}">
@@ -7297,79 +7335,13 @@
           <a:p>
             <a:r>
               <a:rPr lang="en-US" dirty="0" smtClean="0"/>
-              <a:t>Wiki Links</a:t>
+              <a:t>Website </a:t>
+            </a:r>
+            <a:r>
+              <a:rPr lang="en-US" dirty="0" smtClean="0"/>
+              <a:t>Links</a:t>
             </a:r>
             <a:endParaRPr lang="en-US" dirty="0"/>
-          </a:p>
-        </p:txBody>
-      </p:sp>
-      <p:sp>
-        <p:nvSpPr>
-          <p:cNvPr id="4" name="Date Placeholder 3"/>
-          <p:cNvSpPr>
-            <a:spLocks noGrp="1"/>
-          </p:cNvSpPr>
-          <p:nvPr>
-            <p:ph type="dt" sz="half" idx="2"/>
-          </p:nvPr>
-        </p:nvSpPr>
-        <p:spPr/>
-        <p:txBody>
-          <a:bodyPr/>
-          <a:lstStyle/>
-          <a:p>
-            <a:r>
-              <a:rPr lang="en-US" smtClean="0"/>
-              <a:t>10/21/2011</a:t>
-            </a:r>
-            <a:endParaRPr lang="en-US" dirty="0"/>
-          </a:p>
-        </p:txBody>
-      </p:sp>
-      <p:sp>
-        <p:nvSpPr>
-          <p:cNvPr id="5" name="Footer Placeholder 4"/>
-          <p:cNvSpPr>
-            <a:spLocks noGrp="1"/>
-          </p:cNvSpPr>
-          <p:nvPr>
-            <p:ph type="ftr" sz="quarter" idx="3"/>
-          </p:nvPr>
-        </p:nvSpPr>
-        <p:spPr/>
-        <p:txBody>
-          <a:bodyPr/>
-          <a:lstStyle/>
-          <a:p>
-            <a:r>
-              <a:rPr lang="en-US" smtClean="0"/>
-              <a:t>Getting Started        Copyright (c) 2011 University of Pennsylvania. All rights reserved.</a:t>
-            </a:r>
-            <a:endParaRPr lang="en-US" dirty="0"/>
-          </a:p>
-        </p:txBody>
-      </p:sp>
-      <p:sp>
-        <p:nvSpPr>
-          <p:cNvPr id="6" name="Slide Number Placeholder 5"/>
-          <p:cNvSpPr>
-            <a:spLocks noGrp="1"/>
-          </p:cNvSpPr>
-          <p:nvPr>
-            <p:ph type="sldNum" sz="quarter" idx="4"/>
-          </p:nvPr>
-        </p:nvSpPr>
-        <p:spPr/>
-        <p:txBody>
-          <a:bodyPr/>
-          <a:lstStyle/>
-          <a:p>
-            <a:fld id="{93682E96-E16A-4EC4-A9C4-BF3FFE98BFA7}" type="slidenum">
-              <a:rPr lang="en-US" smtClean="0"/>
-              <a:pPr/>
-              <a:t>14</a:t>
-            </a:fld>
-            <a:endParaRPr lang="en-US"/>
           </a:p>
         </p:txBody>
       </p:sp>
@@ -12466,54 +12438,30 @@
           <a:lstStyle/>
           <a:p>
             <a:r>
-              <a:rPr lang="en-US" sz="2400" dirty="0" smtClean="0"/>
-              <a:t>To follow the steps in this </a:t>
-            </a:r>
-            <a:r>
               <a:rPr lang="en-US" sz="2400" dirty="0"/>
-              <a:t>q</a:t>
-            </a:r>
-            <a:r>
-              <a:rPr lang="en-US" sz="2400" dirty="0" smtClean="0"/>
-              <a:t>uick </a:t>
-            </a:r>
-            <a:r>
-              <a:rPr lang="en-US" sz="2400" dirty="0"/>
-              <a:t>s</a:t>
-            </a:r>
-            <a:r>
-              <a:rPr lang="en-US" sz="2400" dirty="0" smtClean="0"/>
-              <a:t>tart </a:t>
-            </a:r>
-            <a:r>
-              <a:rPr lang="en-US" sz="2400" dirty="0"/>
-              <a:t>g</a:t>
-            </a:r>
-            <a:r>
-              <a:rPr lang="en-US" sz="2400" dirty="0" smtClean="0"/>
-              <a:t>uide, you need to have a Unix-like operating system</a:t>
-            </a:r>
-            <a:r>
-              <a:rPr lang="en-US" sz="2400" dirty="0" smtClean="0"/>
-              <a:t>.</a:t>
+              <a:t>To follow the steps in this quick start guide, you need to have a Unix-like operating system.</a:t>
             </a:r>
           </a:p>
           <a:p>
             <a:pPr lvl="1"/>
             <a:r>
+              <a:rPr lang="en-US" sz="2000" dirty="0"/>
+              <a:t>Linux</a:t>
+            </a:r>
+          </a:p>
+          <a:p>
+            <a:pPr lvl="1"/>
+            <a:r>
+              <a:rPr lang="en-US" sz="2000" dirty="0"/>
+              <a:t>Mac OS </a:t>
+            </a:r>
+            <a:r>
               <a:rPr lang="en-US" sz="2000" dirty="0" smtClean="0"/>
-              <a:t>Linux</a:t>
+              <a:t>X</a:t>
             </a:r>
           </a:p>
           <a:p>
             <a:pPr lvl="1"/>
-            <a:r>
-              <a:rPr lang="en-US" sz="2000" dirty="0" smtClean="0"/>
-              <a:t>Mac OS X</a:t>
-            </a:r>
-            <a:endParaRPr lang="en-US" sz="2000" dirty="0" smtClean="0"/>
-          </a:p>
-          <a:p>
             <a:endParaRPr lang="en-US" sz="2400" dirty="0"/>
           </a:p>
           <a:p>
@@ -12528,23 +12476,7 @@
           <a:p>
             <a:r>
               <a:rPr lang="en-US" sz="2400" dirty="0" smtClean="0"/>
-              <a:t>At the moment, there is no separate </a:t>
-            </a:r>
-            <a:r>
-              <a:rPr lang="en-US" sz="2400" dirty="0"/>
-              <a:t>q</a:t>
-            </a:r>
-            <a:r>
-              <a:rPr lang="en-US" sz="2400" dirty="0" smtClean="0"/>
-              <a:t>uick </a:t>
-            </a:r>
-            <a:r>
-              <a:rPr lang="en-US" sz="2400" dirty="0"/>
-              <a:t>s</a:t>
-            </a:r>
-            <a:r>
-              <a:rPr lang="en-US" sz="2400" dirty="0" smtClean="0"/>
-              <a:t>tart guide available for Windows users.</a:t>
+              <a:t>At the moment, there is no separate tutorial available for Windows users.</a:t>
             </a:r>
           </a:p>
           <a:p>
@@ -12600,7 +12532,7 @@
     </p:spTree>
     <p:extLst>
       <p:ext uri="{BB962C8B-B14F-4D97-AF65-F5344CB8AC3E}">
-        <p14:creationId xmlns:p14="http://schemas.microsoft.com/office/powerpoint/2010/main" val="2191304894"/>
+        <p14:creationId xmlns:p14="http://schemas.microsoft.com/office/powerpoint/2010/main" val="3564320973"/>
       </p:ext>
     </p:extLst>
   </p:cSld>

</xml_diff>

<commit_message>
Minor corrections of tutorial slides.
</commit_message>
<xml_diff>
--- a/doc/tutorials/BASIS Quick Start Guide - 01 Getting Started.pptx
+++ b/doc/tutorials/BASIS Quick Start Guide - 01 Getting Started.pptx
@@ -219,7 +219,7 @@
           <a:p>
             <a:fld id="{5B59E269-598F-4F58-85D0-C434FC9453F6}" type="datetimeFigureOut">
               <a:rPr lang="en-US" smtClean="0"/>
-              <a:t>11/11/13</a:t>
+              <a:t>11/26/13</a:t>
             </a:fld>
             <a:endParaRPr lang="en-US"/>
           </a:p>
@@ -5851,11 +5851,7 @@
             </a:r>
             <a:r>
               <a:rPr lang="en-US" dirty="0" smtClean="0"/>
-              <a:t>, updated by </a:t>
-            </a:r>
-            <a:r>
-              <a:rPr lang="en-US" dirty="0" smtClean="0"/>
-              <a:t>Andrew Hundt</a:t>
+              <a:t>, updated by Andrew Hundt</a:t>
             </a:r>
             <a:endParaRPr lang="en-US" dirty="0"/>
           </a:p>
@@ -5924,15 +5920,7 @@
             </a:r>
             <a:r>
               <a:rPr lang="en-US" dirty="0" smtClean="0"/>
-              <a:t>1</a:t>
-            </a:r>
-            <a:r>
-              <a:rPr lang="en-US" dirty="0" smtClean="0"/>
-              <a:t>/</a:t>
-            </a:r>
-            <a:r>
-              <a:rPr lang="en-US" dirty="0" smtClean="0"/>
-              <a:t>2013</a:t>
+              <a:t>1/2013</a:t>
             </a:r>
             <a:endParaRPr lang="en-US" dirty="0"/>
           </a:p>
@@ -6328,11 +6316,7 @@
           <a:p>
             <a:r>
               <a:rPr lang="en-US" sz="2400" dirty="0" smtClean="0"/>
-              <a:t>Set </a:t>
-            </a:r>
-            <a:r>
-              <a:rPr lang="en-US" sz="2400" dirty="0" smtClean="0"/>
-              <a:t>the following environment variables:</a:t>
+              <a:t>Set the following environment variables:</a:t>
             </a:r>
           </a:p>
           <a:p>
@@ -6745,15 +6729,7 @@
           <a:p>
             <a:r>
               <a:rPr lang="en-US" dirty="0" smtClean="0"/>
-              <a:t>How do I create my own </a:t>
-            </a:r>
-            <a:r>
-              <a:rPr lang="en-US" dirty="0" smtClean="0"/>
-              <a:t>BASIS conforming project</a:t>
-            </a:r>
-            <a:r>
-              <a:rPr lang="en-US" dirty="0" smtClean="0"/>
-              <a:t>?</a:t>
+              <a:t>How do I create my own BASIS conforming project?</a:t>
             </a:r>
             <a:endParaRPr lang="en-US" dirty="0"/>
           </a:p>
@@ -7335,11 +7311,7 @@
           <a:p>
             <a:r>
               <a:rPr lang="en-US" dirty="0" smtClean="0"/>
-              <a:t>Website </a:t>
-            </a:r>
-            <a:r>
-              <a:rPr lang="en-US" dirty="0" smtClean="0"/>
-              <a:t>Links</a:t>
+              <a:t>Website Links</a:t>
             </a:r>
             <a:endParaRPr lang="en-US" dirty="0"/>
           </a:p>
@@ -7364,15 +7336,7 @@
           <a:p>
             <a:r>
               <a:rPr lang="en-US" sz="2400" dirty="0" smtClean="0"/>
-              <a:t>More details on the creation of a new BASIS project and its modification afterwards using the project tool of BASIS can be found on the </a:t>
-            </a:r>
-            <a:r>
-              <a:rPr lang="en-US" sz="2400" dirty="0" smtClean="0"/>
-              <a:t>website of </a:t>
-            </a:r>
-            <a:r>
-              <a:rPr lang="en-US" sz="2400" dirty="0" smtClean="0"/>
-              <a:t>SBIA at:</a:t>
+              <a:t>More details on the creation of a new BASIS project and its modification afterwards using the project tool of BASIS can be found on the website of SBIA at:</a:t>
             </a:r>
           </a:p>
           <a:p>
@@ -7648,25 +7612,34 @@
             </a:r>
             <a:r>
               <a:rPr lang="en-US" sz="2400" dirty="0" smtClean="0"/>
-              <a:t>-based projects are build this way. Therefore, the file </a:t>
+              <a:t>-based projects are build this way. </a:t>
+            </a:r>
+            <a:r>
+              <a:rPr lang="en-US" sz="2400" dirty="0" smtClean="0"/>
+              <a:t>The </a:t>
+            </a:r>
+            <a:r>
+              <a:rPr lang="en-US" sz="2400" dirty="0" smtClean="0">
+                <a:latin typeface="Courier New" pitchFamily="49" charset="0"/>
+                <a:cs typeface="Courier New" pitchFamily="49" charset="0"/>
+                <a:hlinkClick r:id="rId3"/>
+              </a:rPr>
+              <a:t>Build and Installation How-to</a:t>
             </a:r>
             <a:r>
               <a:rPr lang="en-US" sz="2400" dirty="0">
                 <a:latin typeface="Courier New" pitchFamily="49" charset="0"/>
                 <a:cs typeface="Courier New" pitchFamily="49" charset="0"/>
-                <a:hlinkClick r:id="rId3"/>
-              </a:rPr>
-              <a:t>INSTALL-basis.txt</a:t>
-            </a:r>
-            <a:r>
-              <a:rPr lang="en-US" sz="2400" dirty="0" smtClean="0">
-                <a:hlinkClick r:id="rId3"/>
               </a:rPr>
               <a:t> </a:t>
             </a:r>
             <a:r>
               <a:rPr lang="en-US" sz="2400" dirty="0" smtClean="0"/>
-              <a:t>which is part of BASIS summarizes these steps.</a:t>
+              <a:t>summarizes </a:t>
+            </a:r>
+            <a:r>
+              <a:rPr lang="en-US" sz="2400" dirty="0" smtClean="0"/>
+              <a:t>these steps.</a:t>
             </a:r>
           </a:p>
           <a:p>
@@ -12229,36 +12202,16 @@
           <a:p>
             <a:r>
               <a:rPr lang="en-US" sz="2400" dirty="0" smtClean="0"/>
-              <a:t>First install </a:t>
-            </a:r>
+              <a:t>First install BASIS on your system.</a:t>
+            </a:r>
+          </a:p>
+          <a:p>
+            <a:endParaRPr lang="en-US" sz="2400" dirty="0" smtClean="0"/>
+          </a:p>
+          <a:p>
             <a:r>
               <a:rPr lang="en-US" sz="2400" dirty="0" smtClean="0"/>
-              <a:t>BASIS </a:t>
-            </a:r>
-            <a:r>
-              <a:rPr lang="en-US" sz="2400" dirty="0" smtClean="0"/>
-              <a:t>on your </a:t>
-            </a:r>
-            <a:r>
-              <a:rPr lang="en-US" sz="2400" dirty="0" smtClean="0"/>
-              <a:t>system.</a:t>
-            </a:r>
-          </a:p>
-          <a:p>
-            <a:endParaRPr lang="en-US" sz="2400" dirty="0" smtClean="0"/>
-          </a:p>
-          <a:p>
-            <a:r>
-              <a:rPr lang="en-US" sz="2400" dirty="0" smtClean="0"/>
-              <a:t>Use the </a:t>
-            </a:r>
-            <a:r>
-              <a:rPr lang="en-US" sz="2400" dirty="0" smtClean="0"/>
-              <a:t>so-</a:t>
-            </a:r>
-            <a:r>
-              <a:rPr lang="en-US" sz="2400" dirty="0" smtClean="0"/>
-              <a:t>called “</a:t>
+              <a:t>Use the so-called “</a:t>
             </a:r>
             <a:r>
               <a:rPr lang="en-US" sz="2400" dirty="0" err="1" smtClean="0"/>
@@ -12266,49 +12219,25 @@
             </a:r>
             <a:r>
               <a:rPr lang="en-US" sz="2400" dirty="0" smtClean="0"/>
-              <a:t>” command line tool to </a:t>
-            </a:r>
+              <a:t>” command line tool to create a new empty project.</a:t>
+            </a:r>
+          </a:p>
+          <a:p>
+            <a:endParaRPr lang="en-US" sz="2400" dirty="0"/>
+          </a:p>
+          <a:p>
             <a:r>
               <a:rPr lang="en-US" sz="2400" dirty="0" smtClean="0"/>
-              <a:t>create a </a:t>
-            </a:r>
+              <a:t>Add some example source files and edit the build configuration files to build the executable and library files.</a:t>
+            </a:r>
+          </a:p>
+          <a:p>
+            <a:endParaRPr lang="en-US" sz="2400" dirty="0"/>
+          </a:p>
+          <a:p>
             <a:r>
               <a:rPr lang="en-US" sz="2400" dirty="0" smtClean="0"/>
-              <a:t>new empty </a:t>
-            </a:r>
-            <a:r>
-              <a:rPr lang="en-US" sz="2400" dirty="0" smtClean="0"/>
-              <a:t>project.</a:t>
-            </a:r>
-          </a:p>
-          <a:p>
-            <a:endParaRPr lang="en-US" sz="2400" dirty="0"/>
-          </a:p>
-          <a:p>
-            <a:r>
-              <a:rPr lang="en-US" sz="2400" dirty="0" smtClean="0"/>
-              <a:t>Add </a:t>
-            </a:r>
-            <a:r>
-              <a:rPr lang="en-US" sz="2400" dirty="0" smtClean="0"/>
-              <a:t>some example source files and edit the build configuration files to build the executable and library files.</a:t>
-            </a:r>
-          </a:p>
-          <a:p>
-            <a:endParaRPr lang="en-US" sz="2400" dirty="0"/>
-          </a:p>
-          <a:p>
-            <a:r>
-              <a:rPr lang="en-US" sz="2400" dirty="0" smtClean="0"/>
-              <a:t>Finally, </a:t>
-            </a:r>
-            <a:r>
-              <a:rPr lang="en-US" sz="2400" dirty="0" smtClean="0"/>
-              <a:t>build </a:t>
-            </a:r>
-            <a:r>
-              <a:rPr lang="en-US" sz="2400" dirty="0" smtClean="0"/>
-              <a:t>and test the example project.</a:t>
+              <a:t>Finally, build and test the example project.</a:t>
             </a:r>
           </a:p>
           <a:p>
@@ -12761,13 +12690,8 @@
           <a:p>
             <a:r>
               <a:rPr lang="en-US" sz="2400" dirty="0" smtClean="0"/>
-              <a:t>Download the source code of </a:t>
-            </a:r>
-            <a:r>
-              <a:rPr lang="en-US" sz="2400" dirty="0" smtClean="0"/>
-              <a:t>BASIS:</a:t>
-            </a:r>
-            <a:endParaRPr lang="en-US" sz="2400" dirty="0" smtClean="0"/>
+              <a:t>Download the source code of BASIS:</a:t>
+            </a:r>
           </a:p>
           <a:p>
             <a:endParaRPr lang="en-US" sz="2400" dirty="0" smtClean="0"/>
@@ -13099,21 +13023,7 @@
                 <a:latin typeface="Courier New" pitchFamily="49" charset="0"/>
                 <a:cs typeface="Courier New" pitchFamily="49" charset="0"/>
               </a:rPr>
-              <a:t> </a:t>
-            </a:r>
-            <a:r>
-              <a:rPr lang="en-US" sz="1600" dirty="0" smtClean="0">
-                <a:latin typeface="Courier New" pitchFamily="49" charset="0"/>
-                <a:cs typeface="Courier New" pitchFamily="49" charset="0"/>
-              </a:rPr>
-              <a:t>basis-</a:t>
-            </a:r>
-            <a:r>
-              <a:rPr lang="en-US" sz="1600" dirty="0" smtClean="0">
-                <a:latin typeface="Courier New" pitchFamily="49" charset="0"/>
-                <a:cs typeface="Courier New" pitchFamily="49" charset="0"/>
-              </a:rPr>
-              <a:t>build</a:t>
+              <a:t> basis-build</a:t>
             </a:r>
           </a:p>
           <a:p>
@@ -13126,21 +13036,7 @@
                 <a:latin typeface="Courier New" pitchFamily="49" charset="0"/>
                 <a:cs typeface="Courier New" pitchFamily="49" charset="0"/>
               </a:rPr>
-              <a:t>cd </a:t>
-            </a:r>
-            <a:r>
-              <a:rPr lang="en-US" sz="1600" dirty="0" smtClean="0">
-                <a:latin typeface="Courier New" pitchFamily="49" charset="0"/>
-                <a:cs typeface="Courier New" pitchFamily="49" charset="0"/>
-              </a:rPr>
-              <a:t>basis-</a:t>
-            </a:r>
-            <a:r>
-              <a:rPr lang="en-US" sz="1600" dirty="0" smtClean="0">
-                <a:latin typeface="Courier New" pitchFamily="49" charset="0"/>
-                <a:cs typeface="Courier New" pitchFamily="49" charset="0"/>
-              </a:rPr>
-              <a:t>build</a:t>
+              <a:t>cd basis-build</a:t>
             </a:r>
           </a:p>
           <a:p>
@@ -13167,19 +13063,8 @@
                 <a:latin typeface="Courier New" pitchFamily="49" charset="0"/>
                 <a:cs typeface="Courier New" pitchFamily="49" charset="0"/>
               </a:rPr>
-              <a:t> ../</a:t>
-            </a:r>
-            <a:r>
-              <a:rPr lang="en-US" sz="1600" dirty="0" smtClean="0">
-                <a:latin typeface="Courier New" pitchFamily="49" charset="0"/>
-                <a:cs typeface="Courier New" pitchFamily="49" charset="0"/>
-              </a:rPr>
-              <a:t>basis</a:t>
-            </a:r>
-            <a:endParaRPr lang="en-US" sz="1600" dirty="0" smtClean="0">
-              <a:latin typeface="Courier New" pitchFamily="49" charset="0"/>
-              <a:cs typeface="Courier New" pitchFamily="49" charset="0"/>
-            </a:endParaRPr>
+              <a:t> ../basis</a:t>
+            </a:r>
           </a:p>
           <a:p>
             <a:pPr lvl="1">

</xml_diff>

<commit_message>
Issue #254 Minor Getting Started Quick Start powerpoint improvements.
</commit_message>
<xml_diff>
--- a/doc/tutorials/BASIS Quick Start Guide - 01 Getting Started.pptx
+++ b/doc/tutorials/BASIS Quick Start Guide - 01 Getting Started.pptx
@@ -219,7 +219,7 @@
           <a:p>
             <a:fld id="{5B59E269-598F-4F58-85D0-C434FC9453F6}" type="datetimeFigureOut">
               <a:rPr lang="en-US" smtClean="0"/>
-              <a:t>11/26/13</a:t>
+              <a:t>1/5/14</a:t>
             </a:fld>
             <a:endParaRPr lang="en-US"/>
           </a:p>
@@ -7037,7 +7037,7 @@
               <a:rPr lang="en-US" sz="2400" dirty="0" smtClean="0">
                 <a:cs typeface="Courier New" pitchFamily="49" charset="0"/>
               </a:rPr>
-              <a:t>odify a previously created project using again the project tool:</a:t>
+              <a:t>odify a previously created project by using the project tool again:</a:t>
             </a:r>
           </a:p>
           <a:p>
@@ -7612,43 +7612,35 @@
             </a:r>
             <a:r>
               <a:rPr lang="en-US" sz="2400" dirty="0" smtClean="0"/>
-              <a:t>-based projects are build this way. </a:t>
+              <a:t>-based projects are build this way. The </a:t>
+            </a:r>
+            <a:r>
+              <a:rPr lang="en-US" sz="2400" dirty="0" smtClean="0">
+                <a:latin typeface="Courier New" pitchFamily="49" charset="0"/>
+                <a:cs typeface="Courier New" pitchFamily="49" charset="0"/>
+                <a:hlinkClick r:id="rId3"/>
+              </a:rPr>
+              <a:t>Build and Installation How-to</a:t>
+            </a:r>
+            <a:r>
+              <a:rPr lang="en-US" sz="2400" dirty="0">
+                <a:latin typeface="Courier New" pitchFamily="49" charset="0"/>
+                <a:cs typeface="Courier New" pitchFamily="49" charset="0"/>
+              </a:rPr>
+              <a:t> </a:t>
             </a:r>
             <a:r>
               <a:rPr lang="en-US" sz="2400" dirty="0" smtClean="0"/>
-              <a:t>The </a:t>
-            </a:r>
-            <a:r>
-              <a:rPr lang="en-US" sz="2400" dirty="0" smtClean="0">
-                <a:latin typeface="Courier New" pitchFamily="49" charset="0"/>
-                <a:cs typeface="Courier New" pitchFamily="49" charset="0"/>
-                <a:hlinkClick r:id="rId3"/>
-              </a:rPr>
-              <a:t>Build and Installation How-to</a:t>
-            </a:r>
-            <a:r>
-              <a:rPr lang="en-US" sz="2400" dirty="0">
-                <a:latin typeface="Courier New" pitchFamily="49" charset="0"/>
-                <a:cs typeface="Courier New" pitchFamily="49" charset="0"/>
-              </a:rPr>
-              <a:t> </a:t>
-            </a:r>
+              <a:t>summarizes these steps.</a:t>
+            </a:r>
+          </a:p>
+          <a:p>
+            <a:endParaRPr lang="en-US" sz="2400" dirty="0" smtClean="0"/>
+          </a:p>
+          <a:p>
             <a:r>
               <a:rPr lang="en-US" sz="2400" dirty="0" smtClean="0"/>
-              <a:t>summarizes </a:t>
-            </a:r>
-            <a:r>
-              <a:rPr lang="en-US" sz="2400" dirty="0" smtClean="0"/>
-              <a:t>these steps.</a:t>
-            </a:r>
-          </a:p>
-          <a:p>
-            <a:endParaRPr lang="en-US" sz="2400" dirty="0" smtClean="0"/>
-          </a:p>
-          <a:p>
-            <a:r>
-              <a:rPr lang="en-US" sz="2400" dirty="0" smtClean="0"/>
-              <a:t>Build and install the (yet empty) project:</a:t>
+              <a:t>Build and install the (currently empty) project:</a:t>
             </a:r>
           </a:p>
           <a:p>

</xml_diff>